<commit_message>
cleaned up dload plotting. made the arrow lengths and heads dynamically sized based on slope. also scaled dload size to gamma_water
</commit_message>
<xml_diff>
--- a/docs/spencer_test.pptx
+++ b/docs/spencer_test.pptx
@@ -3603,11 +3603,7 @@
             </a:r>
             <a:r>
               <a:rPr lang="en-US" dirty="0"/>
-              <a:t> up to about 500. Then </a:t>
-            </a:r>
-            <a:r>
-              <a:rPr lang="en-US"/>
-              <a:t>it crashes.</a:t>
+              <a:t> up to about 500. Then it crashes.</a:t>
             </a:r>
           </a:p>
         </p:txBody>

</xml_diff>

<commit_message>
added a finite element paper
</commit_message>
<xml_diff>
--- a/docs/spencer_test.pptx
+++ b/docs/spencer_test.pptx
@@ -8,6 +8,8 @@
     <p:sldId id="256" r:id="rId2"/>
     <p:sldId id="257" r:id="rId3"/>
     <p:sldId id="258" r:id="rId4"/>
+    <p:sldId id="259" r:id="rId5"/>
+    <p:sldId id="260" r:id="rId6"/>
   </p:sldIdLst>
   <p:sldSz cx="12192000" cy="6858000"/>
   <p:notesSz cx="6858000" cy="9144000"/>
@@ -106,6 +108,11 @@
       </a:defRPr>
     </a:lvl9pPr>
   </p:defaultTextStyle>
+  <p:extLst>
+    <p:ext uri="{EFAFB233-063F-42B5-8137-9DF3F51BA10A}">
+      <p15:sldGuideLst xmlns:p15="http://schemas.microsoft.com/office/powerpoint/2012/main"/>
+    </p:ext>
+  </p:extLst>
 </p:presentation>
 </file>
 
@@ -256,7 +263,7 @@
           <a:p>
             <a:fld id="{1C124515-B0EF-EF45-99A9-8C9E93BBC1B4}" type="datetimeFigureOut">
               <a:rPr lang="en-US" smtClean="0"/>
-              <a:t>6/25/25</a:t>
+              <a:t>7/2/25</a:t>
             </a:fld>
             <a:endParaRPr lang="en-US"/>
           </a:p>
@@ -454,7 +461,7 @@
           <a:p>
             <a:fld id="{1C124515-B0EF-EF45-99A9-8C9E93BBC1B4}" type="datetimeFigureOut">
               <a:rPr lang="en-US" smtClean="0"/>
-              <a:t>6/25/25</a:t>
+              <a:t>7/2/25</a:t>
             </a:fld>
             <a:endParaRPr lang="en-US"/>
           </a:p>
@@ -662,7 +669,7 @@
           <a:p>
             <a:fld id="{1C124515-B0EF-EF45-99A9-8C9E93BBC1B4}" type="datetimeFigureOut">
               <a:rPr lang="en-US" smtClean="0"/>
-              <a:t>6/25/25</a:t>
+              <a:t>7/2/25</a:t>
             </a:fld>
             <a:endParaRPr lang="en-US"/>
           </a:p>
@@ -860,7 +867,7 @@
           <a:p>
             <a:fld id="{1C124515-B0EF-EF45-99A9-8C9E93BBC1B4}" type="datetimeFigureOut">
               <a:rPr lang="en-US" smtClean="0"/>
-              <a:t>6/25/25</a:t>
+              <a:t>7/2/25</a:t>
             </a:fld>
             <a:endParaRPr lang="en-US"/>
           </a:p>
@@ -1135,7 +1142,7 @@
           <a:p>
             <a:fld id="{1C124515-B0EF-EF45-99A9-8C9E93BBC1B4}" type="datetimeFigureOut">
               <a:rPr lang="en-US" smtClean="0"/>
-              <a:t>6/25/25</a:t>
+              <a:t>7/2/25</a:t>
             </a:fld>
             <a:endParaRPr lang="en-US"/>
           </a:p>
@@ -1400,7 +1407,7 @@
           <a:p>
             <a:fld id="{1C124515-B0EF-EF45-99A9-8C9E93BBC1B4}" type="datetimeFigureOut">
               <a:rPr lang="en-US" smtClean="0"/>
-              <a:t>6/25/25</a:t>
+              <a:t>7/2/25</a:t>
             </a:fld>
             <a:endParaRPr lang="en-US"/>
           </a:p>
@@ -1812,7 +1819,7 @@
           <a:p>
             <a:fld id="{1C124515-B0EF-EF45-99A9-8C9E93BBC1B4}" type="datetimeFigureOut">
               <a:rPr lang="en-US" smtClean="0"/>
-              <a:t>6/25/25</a:t>
+              <a:t>7/2/25</a:t>
             </a:fld>
             <a:endParaRPr lang="en-US"/>
           </a:p>
@@ -1953,7 +1960,7 @@
           <a:p>
             <a:fld id="{1C124515-B0EF-EF45-99A9-8C9E93BBC1B4}" type="datetimeFigureOut">
               <a:rPr lang="en-US" smtClean="0"/>
-              <a:t>6/25/25</a:t>
+              <a:t>7/2/25</a:t>
             </a:fld>
             <a:endParaRPr lang="en-US"/>
           </a:p>
@@ -2066,7 +2073,7 @@
           <a:p>
             <a:fld id="{1C124515-B0EF-EF45-99A9-8C9E93BBC1B4}" type="datetimeFigureOut">
               <a:rPr lang="en-US" smtClean="0"/>
-              <a:t>6/25/25</a:t>
+              <a:t>7/2/25</a:t>
             </a:fld>
             <a:endParaRPr lang="en-US"/>
           </a:p>
@@ -2377,7 +2384,7 @@
           <a:p>
             <a:fld id="{1C124515-B0EF-EF45-99A9-8C9E93BBC1B4}" type="datetimeFigureOut">
               <a:rPr lang="en-US" smtClean="0"/>
-              <a:t>6/25/25</a:t>
+              <a:t>7/2/25</a:t>
             </a:fld>
             <a:endParaRPr lang="en-US"/>
           </a:p>
@@ -2665,7 +2672,7 @@
           <a:p>
             <a:fld id="{1C124515-B0EF-EF45-99A9-8C9E93BBC1B4}" type="datetimeFigureOut">
               <a:rPr lang="en-US" smtClean="0"/>
-              <a:t>6/25/25</a:t>
+              <a:t>7/2/25</a:t>
             </a:fld>
             <a:endParaRPr lang="en-US"/>
           </a:p>
@@ -2906,7 +2913,7 @@
           <a:p>
             <a:fld id="{1C124515-B0EF-EF45-99A9-8C9E93BBC1B4}" type="datetimeFigureOut">
               <a:rPr lang="en-US" smtClean="0"/>
-              <a:t>6/25/25</a:t>
+              <a:t>7/2/25</a:t>
             </a:fld>
             <a:endParaRPr lang="en-US"/>
           </a:p>
@@ -3621,6 +3628,126 @@
 </p:sld>
 </file>
 
+<file path=ppt/slides/slide4.xml><?xml version="1.0" encoding="utf-8"?>
+<p:sld xmlns:a="http://schemas.openxmlformats.org/drawingml/2006/main" xmlns:r="http://schemas.openxmlformats.org/officeDocument/2006/relationships" xmlns:p="http://schemas.openxmlformats.org/presentationml/2006/main">
+  <p:cSld>
+    <p:spTree>
+      <p:nvGrpSpPr>
+        <p:cNvPr id="1" name=""/>
+        <p:cNvGrpSpPr/>
+        <p:nvPr/>
+      </p:nvGrpSpPr>
+      <p:grpSpPr>
+        <a:xfrm>
+          <a:off x="0" y="0"/>
+          <a:ext cx="0" cy="0"/>
+          <a:chOff x="0" y="0"/>
+          <a:chExt cx="0" cy="0"/>
+        </a:xfrm>
+      </p:grpSpPr>
+      <p:pic>
+        <p:nvPicPr>
+          <p:cNvPr id="2" name="Picture 1">
+            <a:extLst>
+              <a:ext uri="{FF2B5EF4-FFF2-40B4-BE49-F238E27FC236}">
+                <a16:creationId xmlns:a16="http://schemas.microsoft.com/office/drawing/2014/main" id="{B14EC30D-6170-A6AA-D516-2B941EF64691}"/>
+              </a:ext>
+            </a:extLst>
+          </p:cNvPr>
+          <p:cNvPicPr>
+            <a:picLocks noChangeAspect="1"/>
+          </p:cNvPicPr>
+          <p:nvPr/>
+        </p:nvPicPr>
+        <p:blipFill>
+          <a:blip r:embed="rId2"/>
+          <a:stretch>
+            <a:fillRect/>
+          </a:stretch>
+        </p:blipFill>
+        <p:spPr>
+          <a:xfrm>
+            <a:off x="2209800" y="1858123"/>
+            <a:ext cx="7772400" cy="3141754"/>
+          </a:xfrm>
+          <a:prstGeom prst="rect">
+            <a:avLst/>
+          </a:prstGeom>
+        </p:spPr>
+      </p:pic>
+    </p:spTree>
+    <p:extLst>
+      <p:ext uri="{BB962C8B-B14F-4D97-AF65-F5344CB8AC3E}">
+        <p14:creationId xmlns:p14="http://schemas.microsoft.com/office/powerpoint/2010/main" val="3259906146"/>
+      </p:ext>
+    </p:extLst>
+  </p:cSld>
+  <p:clrMapOvr>
+    <a:masterClrMapping/>
+  </p:clrMapOvr>
+</p:sld>
+</file>
+
+<file path=ppt/slides/slide5.xml><?xml version="1.0" encoding="utf-8"?>
+<p:sld xmlns:a="http://schemas.openxmlformats.org/drawingml/2006/main" xmlns:r="http://schemas.openxmlformats.org/officeDocument/2006/relationships" xmlns:p="http://schemas.openxmlformats.org/presentationml/2006/main">
+  <p:cSld>
+    <p:spTree>
+      <p:nvGrpSpPr>
+        <p:cNvPr id="1" name=""/>
+        <p:cNvGrpSpPr/>
+        <p:nvPr/>
+      </p:nvGrpSpPr>
+      <p:grpSpPr>
+        <a:xfrm>
+          <a:off x="0" y="0"/>
+          <a:ext cx="0" cy="0"/>
+          <a:chOff x="0" y="0"/>
+          <a:chExt cx="0" cy="0"/>
+        </a:xfrm>
+      </p:grpSpPr>
+      <p:pic>
+        <p:nvPicPr>
+          <p:cNvPr id="2" name="Picture 1">
+            <a:extLst>
+              <a:ext uri="{FF2B5EF4-FFF2-40B4-BE49-F238E27FC236}">
+                <a16:creationId xmlns:a16="http://schemas.microsoft.com/office/drawing/2014/main" id="{7A0A7041-A5D3-9542-E075-50A57560A4B4}"/>
+              </a:ext>
+            </a:extLst>
+          </p:cNvPr>
+          <p:cNvPicPr>
+            <a:picLocks noChangeAspect="1"/>
+          </p:cNvPicPr>
+          <p:nvPr/>
+        </p:nvPicPr>
+        <p:blipFill>
+          <a:blip r:embed="rId2"/>
+          <a:stretch>
+            <a:fillRect/>
+          </a:stretch>
+        </p:blipFill>
+        <p:spPr>
+          <a:xfrm>
+            <a:off x="2209800" y="1320181"/>
+            <a:ext cx="7772400" cy="4217638"/>
+          </a:xfrm>
+          <a:prstGeom prst="rect">
+            <a:avLst/>
+          </a:prstGeom>
+        </p:spPr>
+      </p:pic>
+    </p:spTree>
+    <p:extLst>
+      <p:ext uri="{BB962C8B-B14F-4D97-AF65-F5344CB8AC3E}">
+        <p14:creationId xmlns:p14="http://schemas.microsoft.com/office/powerpoint/2010/main" val="1468566043"/>
+      </p:ext>
+    </p:extLst>
+  </p:cSld>
+  <p:clrMapOvr>
+    <a:masterClrMapping/>
+  </p:clrMapOvr>
+</p:sld>
+</file>
+
 <file path=ppt/theme/theme1.xml><?xml version="1.0" encoding="utf-8"?>
 <a:theme xmlns:a="http://schemas.openxmlformats.org/drawingml/2006/main" name="Office Theme">
   <a:themeElements>

</xml_diff>